<commit_message>
Updated Lesson 15 materials
</commit_message>
<xml_diff>
--- a/15_ADVANTG/ADVANTG.pptx
+++ b/15_ADVANTG/ADVANTG.pptx
@@ -200,6 +200,9 @@
         </p15:guide>
       </p15:sldGuideLst>
     </p:ext>
+    <p:ext uri="{2D200454-40CA-4A62-9FC3-DE9A4176ACB9}">
+      <p15:notesGuideLst xmlns:p15="http://schemas.microsoft.com/office/powerpoint/2012/main"/>
+    </p:ext>
   </p:extLst>
 </p:presentation>
 </file>
@@ -269,7 +272,7 @@
         <p:nvSpPr>
           <p:cNvPr id="4100" name="Rectangle 4"/>
           <p:cNvSpPr>
-            <a:spLocks noChangeArrowheads="1" noTextEdit="1"/>
+            <a:spLocks noGrp="1" noRot="1" noChangeAspect="1" noChangeArrowheads="1" noTextEdit="1"/>
           </p:cNvSpPr>
           <p:nvPr>
             <p:ph type="sldImg" idx="2"/>
@@ -4731,11 +4734,11 @@
   <p:clrMapOvr>
     <a:masterClrMapping/>
   </p:clrMapOvr>
-  <mc:AlternateContent xmlns:mc="http://schemas.openxmlformats.org/markup-compatibility/2006">
-    <mc:Choice xmlns:p14="http://schemas.microsoft.com/office/powerpoint/2010/main" Requires="p14">
+  <mc:AlternateContent xmlns:mc="http://schemas.openxmlformats.org/markup-compatibility/2006" xmlns:p14="http://schemas.microsoft.com/office/powerpoint/2010/main">
+    <mc:Choice Requires="p14">
       <p:transition spd="slow" p14:dur="2000"/>
     </mc:Choice>
-    <mc:Fallback>
+    <mc:Fallback xmlns="">
       <p:transition spd="slow"/>
     </mc:Fallback>
   </mc:AlternateContent>
@@ -5135,11 +5138,11 @@
   <p:clrMapOvr>
     <a:masterClrMapping/>
   </p:clrMapOvr>
-  <mc:AlternateContent xmlns:mc="http://schemas.openxmlformats.org/markup-compatibility/2006">
-    <mc:Choice xmlns:p14="http://schemas.microsoft.com/office/powerpoint/2010/main" Requires="p14">
+  <mc:AlternateContent xmlns:mc="http://schemas.openxmlformats.org/markup-compatibility/2006" xmlns:p14="http://schemas.microsoft.com/office/powerpoint/2010/main">
+    <mc:Choice Requires="p14">
       <p:transition spd="slow" p14:dur="2000"/>
     </mc:Choice>
-    <mc:Fallback>
+    <mc:Fallback xmlns="">
       <p:transition spd="slow"/>
     </mc:Fallback>
   </mc:AlternateContent>
@@ -5341,11 +5344,11 @@
   <p:clrMapOvr>
     <a:masterClrMapping/>
   </p:clrMapOvr>
-  <mc:AlternateContent xmlns:mc="http://schemas.openxmlformats.org/markup-compatibility/2006">
-    <mc:Choice xmlns:p14="http://schemas.microsoft.com/office/powerpoint/2010/main" Requires="p14">
+  <mc:AlternateContent xmlns:mc="http://schemas.openxmlformats.org/markup-compatibility/2006" xmlns:p14="http://schemas.microsoft.com/office/powerpoint/2010/main">
+    <mc:Choice Requires="p14">
       <p:transition spd="slow" p14:dur="2000"/>
     </mc:Choice>
-    <mc:Fallback>
+    <mc:Fallback xmlns="">
       <p:transition spd="slow"/>
     </mc:Fallback>
   </mc:AlternateContent>
@@ -5353,7 +5356,7 @@
 </file>
 
 <file path=ppt/slides/slide18.xml><?xml version="1.0" encoding="utf-8"?>
-<p:sld xmlns:a="http://schemas.openxmlformats.org/drawingml/2006/main" xmlns:r="http://schemas.openxmlformats.org/officeDocument/2006/relationships" xmlns:p="http://schemas.openxmlformats.org/presentationml/2006/main" show="0">
+<p:sld xmlns:a="http://schemas.openxmlformats.org/drawingml/2006/main" xmlns:r="http://schemas.openxmlformats.org/officeDocument/2006/relationships" xmlns:p="http://schemas.openxmlformats.org/presentationml/2006/main">
   <p:cSld>
     <p:spTree>
       <p:nvGrpSpPr>
@@ -5451,7 +5454,7 @@
           <p:nvPr/>
         </p:nvPicPr>
         <p:blipFill>
-          <a:blip r:embed="rId2">
+          <a:blip r:embed="rId3">
             <a:extLst>
               <a:ext uri="{28A0092B-C50C-407E-A947-70E740481C1C}">
                 <a14:useLocalDpi xmlns:a14="http://schemas.microsoft.com/office/drawing/2010/main" val="0"/>
@@ -5492,7 +5495,7 @@
           <p:nvPr/>
         </p:nvPicPr>
         <p:blipFill>
-          <a:blip r:embed="rId3" cstate="print">
+          <a:blip r:embed="rId4" cstate="print">
             <a:extLst>
               <a:ext uri="{28A0092B-C50C-407E-A947-70E740481C1C}">
                 <a14:useLocalDpi xmlns:a14="http://schemas.microsoft.com/office/drawing/2010/main" val="0"/>
@@ -5547,6 +5550,76 @@
           </a:extLst>
         </p:spPr>
       </p:pic>
+      <p:graphicFrame>
+        <p:nvGraphicFramePr>
+          <p:cNvPr id="7" name="Object 16"/>
+          <p:cNvGraphicFramePr>
+            <a:graphicFrameLocks noChangeAspect="1"/>
+          </p:cNvGraphicFramePr>
+          <p:nvPr>
+            <p:extLst>
+              <p:ext uri="{D42A27DB-BD31-4B8C-83A1-F6EECF244321}">
+                <p14:modId xmlns:p14="http://schemas.microsoft.com/office/powerpoint/2010/main" val="373925732"/>
+              </p:ext>
+            </p:extLst>
+          </p:nvPr>
+        </p:nvGraphicFramePr>
+        <p:xfrm>
+          <a:off x="7299325" y="3879850"/>
+          <a:ext cx="1473200" cy="711200"/>
+        </p:xfrm>
+        <a:graphic>
+          <a:graphicData uri="http://schemas.openxmlformats.org/presentationml/2006/ole">
+            <mc:AlternateContent xmlns:mc="http://schemas.openxmlformats.org/markup-compatibility/2006">
+              <mc:Choice xmlns:v="urn:schemas-microsoft-com:vml" Requires="v">
+                <p:oleObj spid="_x0000_s999426" name="Equation" r:id="rId5" imgW="812520" imgH="393480" progId="Equation.3">
+                  <p:embed/>
+                </p:oleObj>
+              </mc:Choice>
+              <mc:Fallback>
+                <p:oleObj name="Equation" r:id="rId5" imgW="812520" imgH="393480" progId="Equation.3">
+                  <p:embed/>
+                  <p:pic>
+                    <p:nvPicPr>
+                      <p:cNvPr id="0" name=""/>
+                      <p:cNvPicPr>
+                        <a:picLocks noChangeAspect="1" noChangeArrowheads="1"/>
+                      </p:cNvPicPr>
+                      <p:nvPr/>
+                    </p:nvPicPr>
+                    <p:blipFill>
+                      <a:blip r:embed="rId6"/>
+                      <a:srcRect/>
+                      <a:stretch>
+                        <a:fillRect/>
+                      </a:stretch>
+                    </p:blipFill>
+                    <p:spPr bwMode="auto">
+                      <a:xfrm>
+                        <a:off x="7299325" y="3879850"/>
+                        <a:ext cx="1473200" cy="711200"/>
+                      </a:xfrm>
+                      <a:prstGeom prst="rect">
+                        <a:avLst/>
+                      </a:prstGeom>
+                      <a:noFill/>
+                      <a:extLst>
+                        <a:ext uri="{909E8E84-426E-40DD-AFC4-6F175D3DCCD1}">
+                          <a14:hiddenFill xmlns:a14="http://schemas.microsoft.com/office/drawing/2010/main">
+                            <a:solidFill>
+                              <a:srgbClr val="FFFFFF"/>
+                            </a:solidFill>
+                          </a14:hiddenFill>
+                        </a:ext>
+                      </a:extLst>
+                    </p:spPr>
+                  </p:pic>
+                </p:oleObj>
+              </mc:Fallback>
+            </mc:AlternateContent>
+          </a:graphicData>
+        </a:graphic>
+      </p:graphicFrame>
     </p:spTree>
   </p:cSld>
   <p:clrMapOvr>
@@ -5564,7 +5637,7 @@
 </file>
 
 <file path=ppt/slides/slide19.xml><?xml version="1.0" encoding="utf-8"?>
-<p:sld xmlns:a="http://schemas.openxmlformats.org/drawingml/2006/main" xmlns:r="http://schemas.openxmlformats.org/officeDocument/2006/relationships" xmlns:p="http://schemas.openxmlformats.org/presentationml/2006/main">
+<p:sld xmlns:a="http://schemas.openxmlformats.org/drawingml/2006/main" xmlns:r="http://schemas.openxmlformats.org/officeDocument/2006/relationships" xmlns:p="http://schemas.openxmlformats.org/presentationml/2006/main" show="0">
   <p:cSld>
     <p:spTree>
       <p:nvGrpSpPr>
@@ -5780,7 +5853,7 @@
           <a:graphicData uri="http://schemas.openxmlformats.org/presentationml/2006/ole">
             <mc:AlternateContent xmlns:mc="http://schemas.openxmlformats.org/markup-compatibility/2006">
               <mc:Choice xmlns:v="urn:schemas-microsoft-com:vml" Requires="v">
-                <p:oleObj spid="_x0000_s998499" name="Equation" r:id="rId5" imgW="812520" imgH="393480" progId="Equation.3">
+                <p:oleObj spid="_x0000_s998500" name="Equation" r:id="rId5" imgW="812520" imgH="393480" progId="Equation.3">
                   <p:embed/>
                 </p:oleObj>
               </mc:Choice>
@@ -5833,6 +5906,14 @@
   <p:clrMapOvr>
     <a:masterClrMapping/>
   </p:clrMapOvr>
+  <mc:AlternateContent xmlns:mc="http://schemas.openxmlformats.org/markup-compatibility/2006">
+    <mc:Choice xmlns:p14="http://schemas.microsoft.com/office/powerpoint/2010/main" Requires="p14">
+      <p:transition spd="slow" p14:dur="2000"/>
+    </mc:Choice>
+    <mc:Fallback>
+      <p:transition spd="slow"/>
+    </mc:Fallback>
+  </mc:AlternateContent>
 </p:sld>
 </file>
 
@@ -6077,11 +6158,11 @@
   <p:clrMapOvr>
     <a:masterClrMapping/>
   </p:clrMapOvr>
-  <mc:AlternateContent xmlns:mc="http://schemas.openxmlformats.org/markup-compatibility/2006">
-    <mc:Choice xmlns:p14="http://schemas.microsoft.com/office/powerpoint/2010/main" Requires="p14">
+  <mc:AlternateContent xmlns:mc="http://schemas.openxmlformats.org/markup-compatibility/2006" xmlns:p14="http://schemas.microsoft.com/office/powerpoint/2010/main">
+    <mc:Choice Requires="p14">
       <p:transition spd="slow" p14:dur="2000"/>
     </mc:Choice>
-    <mc:Fallback>
+    <mc:Fallback xmlns="">
       <p:transition spd="slow"/>
     </mc:Fallback>
   </mc:AlternateContent>
@@ -6132,11 +6213,11 @@
   <p:clrMapOvr>
     <a:masterClrMapping/>
   </p:clrMapOvr>
-  <mc:AlternateContent xmlns:mc="http://schemas.openxmlformats.org/markup-compatibility/2006">
-    <mc:Choice xmlns:p14="http://schemas.microsoft.com/office/powerpoint/2010/main" Requires="p14">
+  <mc:AlternateContent xmlns:mc="http://schemas.openxmlformats.org/markup-compatibility/2006" xmlns:p14="http://schemas.microsoft.com/office/powerpoint/2010/main">
+    <mc:Choice Requires="p14">
       <p:transition spd="slow" p14:dur="2000"/>
     </mc:Choice>
-    <mc:Fallback>
+    <mc:Fallback xmlns="">
       <p:transition spd="slow"/>
     </mc:Fallback>
   </mc:AlternateContent>
@@ -6327,11 +6408,11 @@
   <p:clrMapOvr>
     <a:masterClrMapping/>
   </p:clrMapOvr>
-  <mc:AlternateContent xmlns:mc="http://schemas.openxmlformats.org/markup-compatibility/2006">
-    <mc:Choice xmlns:p14="http://schemas.microsoft.com/office/powerpoint/2010/main" Requires="p14">
+  <mc:AlternateContent xmlns:mc="http://schemas.openxmlformats.org/markup-compatibility/2006" xmlns:p14="http://schemas.microsoft.com/office/powerpoint/2010/main">
+    <mc:Choice Requires="p14">
       <p:transition spd="slow" p14:dur="2000"/>
     </mc:Choice>
-    <mc:Fallback>
+    <mc:Fallback xmlns="">
       <p:transition spd="slow"/>
     </mc:Fallback>
   </mc:AlternateContent>
@@ -6702,7 +6783,7 @@
           <a:graphicData uri="http://schemas.openxmlformats.org/presentationml/2006/ole">
             <mc:AlternateContent xmlns:mc="http://schemas.openxmlformats.org/markup-compatibility/2006">
               <mc:Choice xmlns:v="urn:schemas-microsoft-com:vml" Requires="v">
-                <p:oleObj spid="_x0000_s976924" name="Equation" r:id="rId3" imgW="558800" imgH="228600" progId="Equation.3">
+                <p:oleObj spid="_x0000_s976929" name="Equation" r:id="rId3" imgW="558800" imgH="228600" progId="Equation.3">
                   <p:embed/>
                 </p:oleObj>
               </mc:Choice>
@@ -6906,7 +6987,7 @@
           <a:graphicData uri="http://schemas.openxmlformats.org/presentationml/2006/ole">
             <mc:AlternateContent xmlns:mc="http://schemas.openxmlformats.org/markup-compatibility/2006">
               <mc:Choice xmlns:v="urn:schemas-microsoft-com:vml" Requires="v">
-                <p:oleObj spid="_x0000_s976925" name="Equation" r:id="rId5" imgW="1841500" imgH="381000" progId="Equation.3">
+                <p:oleObj spid="_x0000_s976930" name="Equation" r:id="rId5" imgW="1841500" imgH="381000" progId="Equation.3">
                   <p:embed/>
                 </p:oleObj>
               </mc:Choice>
@@ -7036,7 +7117,7 @@
           <a:graphicData uri="http://schemas.openxmlformats.org/presentationml/2006/ole">
             <mc:AlternateContent xmlns:mc="http://schemas.openxmlformats.org/markup-compatibility/2006">
               <mc:Choice xmlns:v="urn:schemas-microsoft-com:vml" Requires="v">
-                <p:oleObj spid="_x0000_s976926" name="Equation" r:id="rId7" imgW="1612900" imgH="457200" progId="Equation.3">
+                <p:oleObj spid="_x0000_s976931" name="Equation" r:id="rId7" imgW="1612900" imgH="457200" progId="Equation.3">
                   <p:embed/>
                 </p:oleObj>
               </mc:Choice>
@@ -7166,7 +7247,7 @@
           <a:graphicData uri="http://schemas.openxmlformats.org/presentationml/2006/ole">
             <mc:AlternateContent xmlns:mc="http://schemas.openxmlformats.org/markup-compatibility/2006">
               <mc:Choice xmlns:v="urn:schemas-microsoft-com:vml" Requires="v">
-                <p:oleObj spid="_x0000_s976927" name="Equation" r:id="rId9" imgW="1206500" imgH="431800" progId="Equation.3">
+                <p:oleObj spid="_x0000_s976932" name="Equation" r:id="rId9" imgW="1206500" imgH="431800" progId="Equation.3">
                   <p:embed/>
                 </p:oleObj>
               </mc:Choice>
@@ -7296,7 +7377,7 @@
           <a:graphicData uri="http://schemas.openxmlformats.org/presentationml/2006/ole">
             <mc:AlternateContent xmlns:mc="http://schemas.openxmlformats.org/markup-compatibility/2006">
               <mc:Choice xmlns:v="urn:schemas-microsoft-com:vml" Requires="v">
-                <p:oleObj spid="_x0000_s976928" name="Equation" r:id="rId11" imgW="1269449" imgH="431613" progId="Equation.3">
+                <p:oleObj spid="_x0000_s976933" name="Equation" r:id="rId11" imgW="1269449" imgH="431613" progId="Equation.3">
                   <p:embed/>
                 </p:oleObj>
               </mc:Choice>
@@ -7557,11 +7638,11 @@
   <p:clrMapOvr>
     <a:masterClrMapping/>
   </p:clrMapOvr>
-  <mc:AlternateContent xmlns:mc="http://schemas.openxmlformats.org/markup-compatibility/2006">
-    <mc:Choice xmlns:p14="http://schemas.microsoft.com/office/powerpoint/2010/main" Requires="p14">
+  <mc:AlternateContent xmlns:mc="http://schemas.openxmlformats.org/markup-compatibility/2006" xmlns:p14="http://schemas.microsoft.com/office/powerpoint/2010/main">
+    <mc:Choice Requires="p14">
       <p:transition spd="slow" p14:dur="2000"/>
     </mc:Choice>
-    <mc:Fallback>
+    <mc:Fallback xmlns="">
       <p:transition spd="slow"/>
     </mc:Fallback>
   </mc:AlternateContent>
@@ -9821,11 +9902,11 @@
   <p:clrMapOvr>
     <a:masterClrMapping/>
   </p:clrMapOvr>
-  <mc:AlternateContent xmlns:mc="http://schemas.openxmlformats.org/markup-compatibility/2006">
-    <mc:Choice xmlns:p14="http://schemas.microsoft.com/office/powerpoint/2010/main" Requires="p14">
+  <mc:AlternateContent xmlns:mc="http://schemas.openxmlformats.org/markup-compatibility/2006" xmlns:p14="http://schemas.microsoft.com/office/powerpoint/2010/main">
+    <mc:Choice Requires="p14">
       <p:transition spd="slow" p14:dur="2000"/>
     </mc:Choice>
-    <mc:Fallback>
+    <mc:Fallback xmlns="">
       <p:transition spd="slow"/>
     </mc:Fallback>
   </mc:AlternateContent>

</xml_diff>